<commit_message>
Hide code into src folder for cleanliness
</commit_message>
<xml_diff>
--- a/template_hariraya.pptx
+++ b/template_hariraya.pptx
@@ -52,7 +52,7 @@
         <p:spPr>
           <a:xfrm>
             <a:off x="838080" y="365040"/>
-            <a:ext cx="10514520" cy="1324440"/>
+            <a:ext cx="10514160" cy="1324080"/>
           </a:xfrm>
           <a:prstGeom prst="rect">
             <a:avLst/>
@@ -92,7 +92,7 @@
         <p:spPr>
           <a:xfrm>
             <a:off x="838080" y="1825560"/>
-            <a:ext cx="10514520" cy="4350240"/>
+            <a:ext cx="10514160" cy="4349880"/>
           </a:xfrm>
           <a:prstGeom prst="rect">
             <a:avLst/>
@@ -153,7 +153,7 @@
         <p:txBody>
           <a:bodyPr/>
           <a:p>
-            <a:fld id="{D4D73014-4A62-4525-AB0A-F2AD59BE193D}" type="slidenum">
+            <a:fld id="{5DDA4718-FA23-4C54-BACA-904C4BF5BEAF}" type="slidenum">
               <a:t>&lt;#&gt;</a:t>
             </a:fld>
           </a:p>
@@ -236,7 +236,7 @@
         <p:txBody>
           <a:bodyPr/>
           <a:p>
-            <a:fld id="{9E235816-600B-487D-A68D-E7A864748B92}" type="slidenum">
+            <a:fld id="{F3FC5CA5-FB6F-4966-A5F8-CEC97A0E4617}" type="slidenum">
               <a:t>&lt;#&gt;</a:t>
             </a:fld>
           </a:p>
@@ -319,7 +319,7 @@
         <p:txBody>
           <a:bodyPr/>
           <a:p>
-            <a:fld id="{4C2E89A6-E9A1-402D-AE0B-71F191EBA00F}" type="slidenum">
+            <a:fld id="{39BB12EC-2A77-4146-B2FD-FB57D7FDE9FE}" type="slidenum">
               <a:t>&lt;#&gt;</a:t>
             </a:fld>
           </a:p>
@@ -402,7 +402,7 @@
         <p:txBody>
           <a:bodyPr/>
           <a:p>
-            <a:fld id="{CC0B4F1E-50B2-4A47-B674-30785AF1F72C}" type="slidenum">
+            <a:fld id="{158C0703-9A8F-47D2-8FA3-EAD531AFC916}" type="slidenum">
               <a:t>&lt;#&gt;</a:t>
             </a:fld>
           </a:p>
@@ -485,7 +485,7 @@
         <p:txBody>
           <a:bodyPr/>
           <a:p>
-            <a:fld id="{ADB5807B-C291-41A2-B7ED-C6ACFF26053F}" type="slidenum">
+            <a:fld id="{6EE88D8B-32F8-4E79-8B91-E9BFA6F46775}" type="slidenum">
               <a:t>&lt;#&gt;</a:t>
             </a:fld>
           </a:p>
@@ -547,7 +547,7 @@
         <p:spPr>
           <a:xfrm>
             <a:off x="838080" y="365040"/>
-            <a:ext cx="10514520" cy="1324440"/>
+            <a:ext cx="10514160" cy="1324080"/>
           </a:xfrm>
           <a:prstGeom prst="rect">
             <a:avLst/>
@@ -587,7 +587,7 @@
         <p:spPr>
           <a:xfrm>
             <a:off x="838080" y="1825560"/>
-            <a:ext cx="10514520" cy="4350240"/>
+            <a:ext cx="10514160" cy="4349880"/>
           </a:xfrm>
           <a:prstGeom prst="rect">
             <a:avLst/>
@@ -651,7 +651,7 @@
         <p:txBody>
           <a:bodyPr/>
           <a:p>
-            <a:fld id="{C49C8350-0BEA-438F-A95E-A93912328262}" type="slidenum">
+            <a:fld id="{6A470F14-A346-4450-ABCD-3875F1ADFFA0}" type="slidenum">
               <a:t>&lt;#&gt;</a:t>
             </a:fld>
           </a:p>
@@ -734,7 +734,7 @@
         <p:txBody>
           <a:bodyPr/>
           <a:p>
-            <a:fld id="{EFD29EB3-23D8-4391-8486-0EB18BCB8B0A}" type="slidenum">
+            <a:fld id="{7A43E91A-3EF7-403F-B464-AB3694212A25}" type="slidenum">
               <a:t>&lt;#&gt;</a:t>
             </a:fld>
           </a:p>
@@ -796,7 +796,7 @@
         <p:spPr>
           <a:xfrm>
             <a:off x="838080" y="365040"/>
-            <a:ext cx="10514520" cy="1324440"/>
+            <a:ext cx="10514160" cy="1324080"/>
           </a:xfrm>
           <a:prstGeom prst="rect">
             <a:avLst/>
@@ -836,7 +836,7 @@
         <p:spPr>
           <a:xfrm>
             <a:off x="838080" y="1825560"/>
-            <a:ext cx="5131080" cy="4350240"/>
+            <a:ext cx="5130720" cy="4349880"/>
           </a:xfrm>
           <a:prstGeom prst="rect">
             <a:avLst/>
@@ -878,8 +878,8 @@
         </p:nvSpPr>
         <p:spPr>
           <a:xfrm>
-            <a:off x="6226200" y="1825560"/>
-            <a:ext cx="5131080" cy="4350240"/>
+            <a:off x="6225840" y="1825560"/>
+            <a:ext cx="5130720" cy="4349880"/>
           </a:xfrm>
           <a:prstGeom prst="rect">
             <a:avLst/>
@@ -943,7 +943,7 @@
         <p:txBody>
           <a:bodyPr/>
           <a:p>
-            <a:fld id="{3C06EEF6-6B08-4B99-BA9B-6A2547EE1598}" type="slidenum">
+            <a:fld id="{7D84B768-6B68-4D3B-A29D-9D64123DE503}" type="slidenum">
               <a:t>&lt;#&gt;</a:t>
             </a:fld>
           </a:p>
@@ -1026,7 +1026,7 @@
         <p:txBody>
           <a:bodyPr/>
           <a:p>
-            <a:fld id="{64CDDC70-C2B4-46CB-8159-D959E6AEF107}" type="slidenum">
+            <a:fld id="{61A36F1C-99E0-4672-A227-EEDA2DE72F08}" type="slidenum">
               <a:t>&lt;#&gt;</a:t>
             </a:fld>
           </a:p>
@@ -1088,7 +1088,7 @@
         <p:spPr>
           <a:xfrm>
             <a:off x="838080" y="365040"/>
-            <a:ext cx="10514520" cy="1324440"/>
+            <a:ext cx="10514160" cy="1324080"/>
           </a:xfrm>
           <a:prstGeom prst="rect">
             <a:avLst/>
@@ -1149,7 +1149,7 @@
         <p:txBody>
           <a:bodyPr/>
           <a:p>
-            <a:fld id="{524480EF-6BCD-4FE3-AB6F-7A263D9E005D}" type="slidenum">
+            <a:fld id="{747D20D9-7145-468F-96F0-CB1042CBCFB7}" type="slidenum">
               <a:t>&lt;#&gt;</a:t>
             </a:fld>
           </a:p>
@@ -1232,7 +1232,7 @@
         <p:txBody>
           <a:bodyPr/>
           <a:p>
-            <a:fld id="{683EC951-8640-41A1-AA6D-B6A9258F3C4D}" type="slidenum">
+            <a:fld id="{64A09F81-DA63-4CDC-BB1C-52EFF4AED640}" type="slidenum">
               <a:t>&lt;#&gt;</a:t>
             </a:fld>
           </a:p>
@@ -1301,7 +1301,7 @@
         <p:spPr>
           <a:xfrm>
             <a:off x="838080" y="365040"/>
-            <a:ext cx="10514520" cy="1324440"/>
+            <a:ext cx="10514160" cy="1324080"/>
           </a:xfrm>
           <a:prstGeom prst="rect">
             <a:avLst/>
@@ -1350,7 +1350,7 @@
         <p:spPr>
           <a:xfrm>
             <a:off x="4038480" y="6356520"/>
-            <a:ext cx="4113720" cy="363960"/>
+            <a:ext cx="4113360" cy="363600"/>
           </a:xfrm>
           <a:prstGeom prst="rect">
             <a:avLst/>
@@ -1422,7 +1422,7 @@
         <p:spPr>
           <a:xfrm>
             <a:off x="8610480" y="6356520"/>
-            <a:ext cx="2742120" cy="363960"/>
+            <a:ext cx="2741760" cy="363600"/>
           </a:xfrm>
           <a:prstGeom prst="rect">
             <a:avLst/>
@@ -1465,7 +1465,7 @@
                 <a:tab algn="l" pos="0"/>
               </a:tabLst>
             </a:pPr>
-            <a:fld id="{03C6DB30-507B-4FA6-ADF4-E66CC9485DD3}" type="slidenum">
+            <a:fld id="{53472A97-0450-4F76-9485-27880916A640}" type="slidenum">
               <a:rPr b="0" lang="en-SG" sz="1200" spc="-1" strike="noStrike">
                 <a:solidFill>
                   <a:schemeClr val="dk1">
@@ -1498,7 +1498,7 @@
         <p:spPr>
           <a:xfrm>
             <a:off x="838080" y="6356520"/>
-            <a:ext cx="2742120" cy="363960"/>
+            <a:ext cx="2741760" cy="363600"/>
           </a:xfrm>
           <a:prstGeom prst="rect">
             <a:avLst/>
@@ -1591,7 +1591,7 @@
         <p:spPr>
           <a:xfrm>
             <a:off x="4038480" y="6356520"/>
-            <a:ext cx="4113720" cy="363960"/>
+            <a:ext cx="4113360" cy="363600"/>
           </a:xfrm>
           <a:prstGeom prst="rect">
             <a:avLst/>
@@ -1663,7 +1663,7 @@
         <p:spPr>
           <a:xfrm>
             <a:off x="8610480" y="6356520"/>
-            <a:ext cx="2742120" cy="363960"/>
+            <a:ext cx="2741760" cy="363600"/>
           </a:xfrm>
           <a:prstGeom prst="rect">
             <a:avLst/>
@@ -1706,7 +1706,7 @@
                 <a:tab algn="l" pos="0"/>
               </a:tabLst>
             </a:pPr>
-            <a:fld id="{30CD878D-FE76-45EB-8DE4-4722A9F9EA78}" type="slidenum">
+            <a:fld id="{869F42B9-CEF9-4B89-BF55-E621C36E9F22}" type="slidenum">
               <a:rPr b="0" lang="en-SG" sz="1200" spc="-1" strike="noStrike">
                 <a:solidFill>
                   <a:schemeClr val="dk1">
@@ -1739,7 +1739,7 @@
         <p:spPr>
           <a:xfrm>
             <a:off x="838080" y="6356520"/>
-            <a:ext cx="2742120" cy="363960"/>
+            <a:ext cx="2741760" cy="363600"/>
           </a:xfrm>
           <a:prstGeom prst="rect">
             <a:avLst/>
@@ -1832,7 +1832,7 @@
         <p:spPr>
           <a:xfrm>
             <a:off x="4038480" y="6356520"/>
-            <a:ext cx="4113720" cy="363960"/>
+            <a:ext cx="4113360" cy="363600"/>
           </a:xfrm>
           <a:prstGeom prst="rect">
             <a:avLst/>
@@ -1904,7 +1904,7 @@
         <p:spPr>
           <a:xfrm>
             <a:off x="8610480" y="6356520"/>
-            <a:ext cx="2742120" cy="363960"/>
+            <a:ext cx="2741760" cy="363600"/>
           </a:xfrm>
           <a:prstGeom prst="rect">
             <a:avLst/>
@@ -1947,7 +1947,7 @@
                 <a:tab algn="l" pos="0"/>
               </a:tabLst>
             </a:pPr>
-            <a:fld id="{E9B2A0C7-319D-4C3D-BD01-57618BE2C4E8}" type="slidenum">
+            <a:fld id="{3F519C40-8AD4-4571-9573-7C9DD432B512}" type="slidenum">
               <a:rPr b="0" lang="en-SG" sz="1200" spc="-1" strike="noStrike">
                 <a:solidFill>
                   <a:schemeClr val="dk1">
@@ -1980,7 +1980,7 @@
         <p:spPr>
           <a:xfrm>
             <a:off x="838080" y="6356520"/>
-            <a:ext cx="2742120" cy="363960"/>
+            <a:ext cx="2741760" cy="363600"/>
           </a:xfrm>
           <a:prstGeom prst="rect">
             <a:avLst/>
@@ -2073,7 +2073,7 @@
         <p:spPr>
           <a:xfrm>
             <a:off x="4038480" y="6356520"/>
-            <a:ext cx="4113720" cy="363960"/>
+            <a:ext cx="4113360" cy="363600"/>
           </a:xfrm>
           <a:prstGeom prst="rect">
             <a:avLst/>
@@ -2145,7 +2145,7 @@
         <p:spPr>
           <a:xfrm>
             <a:off x="8610480" y="6356520"/>
-            <a:ext cx="2742120" cy="363960"/>
+            <a:ext cx="2741760" cy="363600"/>
           </a:xfrm>
           <a:prstGeom prst="rect">
             <a:avLst/>
@@ -2188,7 +2188,7 @@
                 <a:tab algn="l" pos="0"/>
               </a:tabLst>
             </a:pPr>
-            <a:fld id="{8FFF355E-6556-4A32-997B-5D8FB3C56533}" type="slidenum">
+            <a:fld id="{F9AD2945-75AF-4F57-910B-A7DA35C4EA28}" type="slidenum">
               <a:rPr b="0" lang="en-SG" sz="1200" spc="-1" strike="noStrike">
                 <a:solidFill>
                   <a:schemeClr val="dk1">
@@ -2221,7 +2221,7 @@
         <p:spPr>
           <a:xfrm>
             <a:off x="838080" y="6356520"/>
-            <a:ext cx="2742120" cy="363960"/>
+            <a:ext cx="2741760" cy="363600"/>
           </a:xfrm>
           <a:prstGeom prst="rect">
             <a:avLst/>
@@ -2314,7 +2314,7 @@
         <p:spPr>
           <a:xfrm>
             <a:off x="4038480" y="6356520"/>
-            <a:ext cx="4113720" cy="363960"/>
+            <a:ext cx="4113360" cy="363600"/>
           </a:xfrm>
           <a:prstGeom prst="rect">
             <a:avLst/>
@@ -2386,7 +2386,7 @@
         <p:spPr>
           <a:xfrm>
             <a:off x="8610480" y="6356520"/>
-            <a:ext cx="2742120" cy="363960"/>
+            <a:ext cx="2741760" cy="363600"/>
           </a:xfrm>
           <a:prstGeom prst="rect">
             <a:avLst/>
@@ -2429,7 +2429,7 @@
                 <a:tab algn="l" pos="0"/>
               </a:tabLst>
             </a:pPr>
-            <a:fld id="{2D7D3427-AC88-4534-A75C-582115ADB024}" type="slidenum">
+            <a:fld id="{D7E50024-5C56-49D6-8FAB-DF18C9EB313C}" type="slidenum">
               <a:rPr b="0" lang="en-SG" sz="1200" spc="-1" strike="noStrike">
                 <a:solidFill>
                   <a:schemeClr val="dk1">
@@ -2462,7 +2462,7 @@
         <p:spPr>
           <a:xfrm>
             <a:off x="838080" y="6356520"/>
-            <a:ext cx="2742120" cy="363960"/>
+            <a:ext cx="2741760" cy="363600"/>
           </a:xfrm>
           <a:prstGeom prst="rect">
             <a:avLst/>
@@ -2555,7 +2555,7 @@
         <p:spPr>
           <a:xfrm>
             <a:off x="838080" y="365040"/>
-            <a:ext cx="10514520" cy="1324440"/>
+            <a:ext cx="10514160" cy="1324080"/>
           </a:xfrm>
           <a:prstGeom prst="rect">
             <a:avLst/>
@@ -2604,7 +2604,7 @@
         <p:spPr>
           <a:xfrm>
             <a:off x="838080" y="1825560"/>
-            <a:ext cx="10514520" cy="4350240"/>
+            <a:ext cx="10514160" cy="4349880"/>
           </a:xfrm>
           <a:prstGeom prst="rect">
             <a:avLst/>
@@ -2829,7 +2829,7 @@
         <p:spPr>
           <a:xfrm>
             <a:off x="4038480" y="6356520"/>
-            <a:ext cx="4113720" cy="363960"/>
+            <a:ext cx="4113360" cy="363600"/>
           </a:xfrm>
           <a:prstGeom prst="rect">
             <a:avLst/>
@@ -2901,7 +2901,7 @@
         <p:spPr>
           <a:xfrm>
             <a:off x="8610480" y="6356520"/>
-            <a:ext cx="2742120" cy="363960"/>
+            <a:ext cx="2741760" cy="363600"/>
           </a:xfrm>
           <a:prstGeom prst="rect">
             <a:avLst/>
@@ -2944,7 +2944,7 @@
                 <a:tab algn="l" pos="0"/>
               </a:tabLst>
             </a:pPr>
-            <a:fld id="{6622A0A6-9856-433E-84FF-20E904340844}" type="slidenum">
+            <a:fld id="{10D76BAB-CB25-4C9C-9F02-541E2B102E98}" type="slidenum">
               <a:rPr b="0" lang="en-SG" sz="1200" spc="-1" strike="noStrike">
                 <a:solidFill>
                   <a:schemeClr val="dk1">
@@ -2977,7 +2977,7 @@
         <p:spPr>
           <a:xfrm>
             <a:off x="838080" y="6356520"/>
-            <a:ext cx="2742120" cy="363960"/>
+            <a:ext cx="2741760" cy="363600"/>
           </a:xfrm>
           <a:prstGeom prst="rect">
             <a:avLst/>
@@ -3070,7 +3070,7 @@
         <p:spPr>
           <a:xfrm>
             <a:off x="4038480" y="6356520"/>
-            <a:ext cx="4113720" cy="363960"/>
+            <a:ext cx="4113360" cy="363600"/>
           </a:xfrm>
           <a:prstGeom prst="rect">
             <a:avLst/>
@@ -3142,7 +3142,7 @@
         <p:spPr>
           <a:xfrm>
             <a:off x="8610480" y="6356520"/>
-            <a:ext cx="2742120" cy="363960"/>
+            <a:ext cx="2741760" cy="363600"/>
           </a:xfrm>
           <a:prstGeom prst="rect">
             <a:avLst/>
@@ -3185,7 +3185,7 @@
                 <a:tab algn="l" pos="0"/>
               </a:tabLst>
             </a:pPr>
-            <a:fld id="{9FB6FF43-F8EC-48A3-9E94-A9C51F4971B6}" type="slidenum">
+            <a:fld id="{1AB62264-28E5-4C9E-8EB2-06DCCCFFB514}" type="slidenum">
               <a:rPr b="0" lang="en-SG" sz="1200" spc="-1" strike="noStrike">
                 <a:solidFill>
                   <a:schemeClr val="dk1">
@@ -3218,7 +3218,7 @@
         <p:spPr>
           <a:xfrm>
             <a:off x="838080" y="6356520"/>
-            <a:ext cx="2742120" cy="363960"/>
+            <a:ext cx="2741760" cy="363600"/>
           </a:xfrm>
           <a:prstGeom prst="rect">
             <a:avLst/>
@@ -3311,7 +3311,7 @@
         <p:spPr>
           <a:xfrm>
             <a:off x="838080" y="365040"/>
-            <a:ext cx="10514520" cy="1324440"/>
+            <a:ext cx="10514160" cy="1324080"/>
           </a:xfrm>
           <a:prstGeom prst="rect">
             <a:avLst/>
@@ -3360,7 +3360,7 @@
         <p:spPr>
           <a:xfrm>
             <a:off x="838080" y="1825560"/>
-            <a:ext cx="5130720" cy="4350240"/>
+            <a:ext cx="5130720" cy="4349880"/>
           </a:xfrm>
           <a:prstGeom prst="rect">
             <a:avLst/>
@@ -3585,7 +3585,7 @@
         <p:spPr>
           <a:xfrm>
             <a:off x="6226200" y="1825560"/>
-            <a:ext cx="5130720" cy="4350240"/>
+            <a:ext cx="5130720" cy="4349880"/>
           </a:xfrm>
           <a:prstGeom prst="rect">
             <a:avLst/>
@@ -3810,7 +3810,7 @@
         <p:spPr>
           <a:xfrm>
             <a:off x="4038480" y="6356520"/>
-            <a:ext cx="4113720" cy="363960"/>
+            <a:ext cx="4113360" cy="363600"/>
           </a:xfrm>
           <a:prstGeom prst="rect">
             <a:avLst/>
@@ -3882,7 +3882,7 @@
         <p:spPr>
           <a:xfrm>
             <a:off x="8610480" y="6356520"/>
-            <a:ext cx="2742120" cy="363960"/>
+            <a:ext cx="2741760" cy="363600"/>
           </a:xfrm>
           <a:prstGeom prst="rect">
             <a:avLst/>
@@ -3925,7 +3925,7 @@
                 <a:tab algn="l" pos="0"/>
               </a:tabLst>
             </a:pPr>
-            <a:fld id="{D16A5CEE-2350-4C7D-A4AC-5C6B2DE6FB69}" type="slidenum">
+            <a:fld id="{FC1CB4F8-D3AF-48FA-9034-FF53FCF13898}" type="slidenum">
               <a:rPr b="0" lang="en-SG" sz="1200" spc="-1" strike="noStrike">
                 <a:solidFill>
                   <a:schemeClr val="dk1">
@@ -3958,7 +3958,7 @@
         <p:spPr>
           <a:xfrm>
             <a:off x="838080" y="6356520"/>
-            <a:ext cx="2742120" cy="363960"/>
+            <a:ext cx="2741760" cy="363600"/>
           </a:xfrm>
           <a:prstGeom prst="rect">
             <a:avLst/>
@@ -4051,7 +4051,7 @@
         <p:spPr>
           <a:xfrm>
             <a:off x="4038480" y="6356520"/>
-            <a:ext cx="4113720" cy="363960"/>
+            <a:ext cx="4113360" cy="363600"/>
           </a:xfrm>
           <a:prstGeom prst="rect">
             <a:avLst/>
@@ -4123,7 +4123,7 @@
         <p:spPr>
           <a:xfrm>
             <a:off x="8610480" y="6356520"/>
-            <a:ext cx="2742120" cy="363960"/>
+            <a:ext cx="2741760" cy="363600"/>
           </a:xfrm>
           <a:prstGeom prst="rect">
             <a:avLst/>
@@ -4166,7 +4166,7 @@
                 <a:tab algn="l" pos="0"/>
               </a:tabLst>
             </a:pPr>
-            <a:fld id="{2A2B41DB-9DBD-4FDF-B398-32BE752FC407}" type="slidenum">
+            <a:fld id="{608BD3A9-9485-4259-8DFC-4790B5EB53D3}" type="slidenum">
               <a:rPr b="0" lang="en-SG" sz="1200" spc="-1" strike="noStrike">
                 <a:solidFill>
                   <a:schemeClr val="dk1">
@@ -4199,7 +4199,7 @@
         <p:spPr>
           <a:xfrm>
             <a:off x="838080" y="6356520"/>
-            <a:ext cx="2742120" cy="363960"/>
+            <a:ext cx="2741760" cy="363600"/>
           </a:xfrm>
           <a:prstGeom prst="rect">
             <a:avLst/>
@@ -4292,7 +4292,7 @@
         <p:spPr>
           <a:xfrm>
             <a:off x="838080" y="365040"/>
-            <a:ext cx="10514520" cy="1324440"/>
+            <a:ext cx="10514160" cy="1324080"/>
           </a:xfrm>
           <a:prstGeom prst="rect">
             <a:avLst/>
@@ -4341,7 +4341,7 @@
         <p:spPr>
           <a:xfrm>
             <a:off x="4038480" y="6356520"/>
-            <a:ext cx="4113720" cy="363960"/>
+            <a:ext cx="4113360" cy="363600"/>
           </a:xfrm>
           <a:prstGeom prst="rect">
             <a:avLst/>
@@ -4413,7 +4413,7 @@
         <p:spPr>
           <a:xfrm>
             <a:off x="8610480" y="6356520"/>
-            <a:ext cx="2742120" cy="363960"/>
+            <a:ext cx="2741760" cy="363600"/>
           </a:xfrm>
           <a:prstGeom prst="rect">
             <a:avLst/>
@@ -4456,7 +4456,7 @@
                 <a:tab algn="l" pos="0"/>
               </a:tabLst>
             </a:pPr>
-            <a:fld id="{9A01892C-2D59-4575-977D-A743A0FB51D1}" type="slidenum">
+            <a:fld id="{FDDE48D4-1011-47D6-8130-61588D2A8878}" type="slidenum">
               <a:rPr b="0" lang="en-SG" sz="1200" spc="-1" strike="noStrike">
                 <a:solidFill>
                   <a:schemeClr val="dk1">
@@ -4489,7 +4489,7 @@
         <p:spPr>
           <a:xfrm>
             <a:off x="838080" y="6356520"/>
-            <a:ext cx="2742120" cy="363960"/>
+            <a:ext cx="2741760" cy="363600"/>
           </a:xfrm>
           <a:prstGeom prst="rect">
             <a:avLst/>
@@ -4582,7 +4582,7 @@
         <p:spPr>
           <a:xfrm>
             <a:off x="4038480" y="6356520"/>
-            <a:ext cx="4113720" cy="363960"/>
+            <a:ext cx="4113360" cy="363600"/>
           </a:xfrm>
           <a:prstGeom prst="rect">
             <a:avLst/>
@@ -4654,7 +4654,7 @@
         <p:spPr>
           <a:xfrm>
             <a:off x="8610480" y="6356520"/>
-            <a:ext cx="2742120" cy="363960"/>
+            <a:ext cx="2741760" cy="363600"/>
           </a:xfrm>
           <a:prstGeom prst="rect">
             <a:avLst/>
@@ -4697,7 +4697,7 @@
                 <a:tab algn="l" pos="0"/>
               </a:tabLst>
             </a:pPr>
-            <a:fld id="{6B19669E-2668-438E-AD07-B2935D3AFE41}" type="slidenum">
+            <a:fld id="{F5782D81-83A6-4D02-B651-9102AD1207DA}" type="slidenum">
               <a:rPr b="0" lang="en-SG" sz="1200" spc="-1" strike="noStrike">
                 <a:solidFill>
                   <a:schemeClr val="dk1">
@@ -4730,7 +4730,7 @@
         <p:spPr>
           <a:xfrm>
             <a:off x="838080" y="6356520"/>
-            <a:ext cx="2742120" cy="363960"/>
+            <a:ext cx="2741760" cy="363600"/>
           </a:xfrm>
           <a:prstGeom prst="rect">
             <a:avLst/>
@@ -4816,7 +4816,7 @@
         <p:spPr>
           <a:xfrm>
             <a:off x="-79200" y="-20520"/>
-            <a:ext cx="12411720" cy="6955560"/>
+            <a:ext cx="12411360" cy="6955200"/>
           </a:xfrm>
           <a:prstGeom prst="rect">
             <a:avLst/>
@@ -4835,7 +4835,7 @@
         <p:spPr>
           <a:xfrm>
             <a:off x="325800" y="265680"/>
-            <a:ext cx="3827160" cy="1004040"/>
+            <a:ext cx="3826800" cy="1004040"/>
           </a:xfrm>
           <a:prstGeom prst="rect">
             <a:avLst/>
@@ -4888,7 +4888,7 @@
         <p:spPr>
           <a:xfrm>
             <a:off x="614880" y="4816440"/>
-            <a:ext cx="5511240" cy="272520"/>
+            <a:ext cx="5510880" cy="272520"/>
           </a:xfrm>
           <a:prstGeom prst="rect">
             <a:avLst/>
@@ -4941,7 +4941,7 @@
         <p:spPr>
           <a:xfrm>
             <a:off x="2460600" y="2444400"/>
-            <a:ext cx="1737720" cy="363960"/>
+            <a:ext cx="1737360" cy="363960"/>
           </a:xfrm>
           <a:prstGeom prst="rect">
             <a:avLst/>
@@ -4962,7 +4962,7 @@
             <a:spAutoFit/>
           </a:bodyPr>
           <a:p>
-            <a:pPr defTabSz="914400">
+            <a:pPr algn="ctr" defTabSz="914400">
               <a:lnSpc>
                 <a:spcPct val="100000"/>
               </a:lnSpc>
@@ -4994,7 +4994,7 @@
         <p:spPr>
           <a:xfrm>
             <a:off x="2355480" y="2807280"/>
-            <a:ext cx="1883520" cy="2009880"/>
+            <a:ext cx="1883160" cy="2009880"/>
           </a:xfrm>
           <a:prstGeom prst="rect">
             <a:avLst/>
@@ -5092,7 +5092,7 @@
         <p:spPr>
           <a:xfrm>
             <a:off x="433080" y="1442520"/>
-            <a:ext cx="6354360" cy="363960"/>
+            <a:ext cx="6354000" cy="363960"/>
           </a:xfrm>
           <a:prstGeom prst="rect">
             <a:avLst/>
@@ -5166,7 +5166,7 @@
         <p:spPr>
           <a:xfrm>
             <a:off x="4092120" y="335160"/>
-            <a:ext cx="1265400" cy="821160"/>
+            <a:ext cx="1265040" cy="821160"/>
           </a:xfrm>
           <a:prstGeom prst="rect">
             <a:avLst/>
@@ -5247,7 +5247,7 @@
         <p:spPr>
           <a:xfrm>
             <a:off x="284760" y="4968720"/>
-            <a:ext cx="2635560" cy="1842120"/>
+            <a:ext cx="2635200" cy="1842120"/>
           </a:xfrm>
           <a:prstGeom prst="rect">
             <a:avLst/>

</xml_diff>